<commit_message>
added github url to slides
</commit_message>
<xml_diff>
--- a/FiletypesAndQualityControl.pptx
+++ b/FiletypesAndQualityControl.pptx
@@ -150,14 +150,6 @@
     </p:ext>
   </p:extLst>
 </p:presentation>
-</file>
-
-<file path=ppt/revisionInfo.xml><?xml version="1.0" encoding="utf-8"?>
-<p1510:revInfo xmlns:a="http://schemas.openxmlformats.org/drawingml/2006/main" xmlns:r="http://schemas.openxmlformats.org/officeDocument/2006/relationships" xmlns:p1510="http://schemas.microsoft.com/office/powerpoint/2015/10/main">
-  <p1510:revLst>
-    <p1510:client id="{849878FB-F9F1-1A4C-8B27-429EC82DAE72}" v="90" dt="2024-10-09T14:58:20.379"/>
-  </p1510:revLst>
-</p1510:revInfo>
 </file>
 
 <file path=ppt/notesMasters/notesMaster1.xml><?xml version="1.0" encoding="utf-8"?>
@@ -14993,13 +14985,13 @@
           <a:lstStyle/>
           <a:p>
             <a:r>
-              <a:rPr lang="en-US" sz="3600" b="1">
+              <a:rPr lang="en-US" sz="3600" b="1" dirty="0">
                 <a:ea typeface="Calibri Light"/>
                 <a:cs typeface="Calibri Light"/>
               </a:rPr>
               <a:t>Research Computing and Data Services</a:t>
             </a:r>
-            <a:endParaRPr lang="en-US" sz="3600" b="1"/>
+            <a:endParaRPr lang="en-US" sz="3600" b="1" dirty="0"/>
           </a:p>
         </p:txBody>
       </p:sp>
@@ -18761,6 +18753,68 @@
             <a:r>
               <a:rPr lang="en-US" sz="2800" dirty="0"/>
               <a:t>&gt;</a:t>
+            </a:r>
+          </a:p>
+        </p:txBody>
+      </p:sp>
+      <p:sp>
+        <p:nvSpPr>
+          <p:cNvPr id="5" name="TextBox 4">
+            <a:extLst>
+              <a:ext uri="{FF2B5EF4-FFF2-40B4-BE49-F238E27FC236}">
+                <a16:creationId xmlns:a16="http://schemas.microsoft.com/office/drawing/2014/main" id="{BC7927B9-BA0F-0B50-E19F-BC3C83BDEBC7}"/>
+              </a:ext>
+            </a:extLst>
+          </p:cNvPr>
+          <p:cNvSpPr txBox="1"/>
+          <p:nvPr/>
+        </p:nvSpPr>
+        <p:spPr>
+          <a:xfrm>
+            <a:off x="928807" y="5547847"/>
+            <a:ext cx="11393821" cy="523220"/>
+          </a:xfrm>
+          <a:prstGeom prst="rect">
+            <a:avLst/>
+          </a:prstGeom>
+          <a:noFill/>
+        </p:spPr>
+        <p:txBody>
+          <a:bodyPr wrap="square">
+            <a:spAutoFit/>
+          </a:bodyPr>
+          <a:lstStyle/>
+          <a:p>
+            <a:pPr marL="457200" lvl="1" indent="0">
+              <a:buNone/>
+            </a:pPr>
+            <a:r>
+              <a:rPr lang="en-US" sz="2800" dirty="0"/>
+              <a:t>These slides are available at </a:t>
+            </a:r>
+            <a:r>
+              <a:rPr lang="en-US" sz="2800" dirty="0" err="1"/>
+              <a:t>github.com</a:t>
+            </a:r>
+            <a:r>
+              <a:rPr lang="en-US" sz="2800" dirty="0"/>
+              <a:t>/</a:t>
+            </a:r>
+            <a:r>
+              <a:rPr lang="en-US" sz="2800" dirty="0" err="1"/>
+              <a:t>nuitrcs</a:t>
+            </a:r>
+            <a:r>
+              <a:rPr lang="en-US" sz="2800" dirty="0"/>
+              <a:t>/</a:t>
+            </a:r>
+            <a:r>
+              <a:rPr lang="en-US" sz="2800" dirty="0" err="1"/>
+              <a:t>genomic_filetypes</a:t>
+            </a:r>
+            <a:r>
+              <a:rPr lang="en-US" sz="2800" dirty="0"/>
+              <a:t> </a:t>
             </a:r>
           </a:p>
         </p:txBody>

</xml_diff>